<commit_message>
updates on report, embedded and next js
</commit_message>
<xml_diff>
--- a/Report/Poster.pptx
+++ b/Report/Poster.pptx
@@ -104,6 +104,11 @@
       </a:defRPr>
     </a:lvl9pPr>
   </p:defaultTextStyle>
+  <p:extLst>
+    <p:ext uri="{EFAFB233-063F-42B5-8137-9DF3F51BA10A}">
+      <p15:sldGuideLst xmlns:p15="http://schemas.microsoft.com/office/powerpoint/2012/main"/>
+    </p:ext>
+  </p:extLst>
 </p:presentation>
 </file>
 
@@ -2966,12 +2971,222 @@
           <a:chExt cx="0" cy="0"/>
         </a:xfrm>
       </p:grpSpPr>
+      <p:sp>
+        <p:nvSpPr>
+          <p:cNvPr id="14" name="TextBox 13">
+            <a:extLst>
+              <a:ext uri="{FF2B5EF4-FFF2-40B4-BE49-F238E27FC236}">
+                <a16:creationId xmlns:a16="http://schemas.microsoft.com/office/drawing/2014/main" id="{1933FFE1-CA7C-4A73-8779-2FD9CC1BA72C}"/>
+              </a:ext>
+            </a:extLst>
+          </p:cNvPr>
+          <p:cNvSpPr txBox="1"/>
+          <p:nvPr/>
+        </p:nvSpPr>
+        <p:spPr>
+          <a:xfrm>
+            <a:off x="1200151" y="4148418"/>
+            <a:ext cx="13430249" cy="24006572"/>
+          </a:xfrm>
+          <a:prstGeom prst="rect">
+            <a:avLst/>
+          </a:prstGeom>
+          <a:noFill/>
+        </p:spPr>
+        <p:txBody>
+          <a:bodyPr wrap="square" rtlCol="0">
+            <a:spAutoFit/>
+          </a:bodyPr>
+          <a:lstStyle/>
+          <a:p>
+            <a:pPr algn="ctr"/>
+            <a:r>
+              <a:rPr lang="en-US" sz="6000" b="1" dirty="0">
+                <a:solidFill>
+                  <a:srgbClr val="8CD23C"/>
+                </a:solidFill>
+                <a:latin typeface="Arial" panose="020B0604020202020204" pitchFamily="34" charset="0"/>
+                <a:cs typeface="Arial" panose="020B0604020202020204" pitchFamily="34" charset="0"/>
+              </a:rPr>
+              <a:t>Summary</a:t>
+            </a:r>
+          </a:p>
+          <a:p>
+            <a:endParaRPr lang="en-US" sz="5400" dirty="0"/>
+          </a:p>
+          <a:p>
+            <a:r>
+              <a:rPr lang="en-US" sz="5400" dirty="0">
+                <a:solidFill>
+                  <a:srgbClr val="B9B9B9"/>
+                </a:solidFill>
+              </a:rPr>
+              <a:t>Aim of project is to monitor and regulate various environment variables, such as temperature, humidity, light, air and water. This is achieved by reading data from sensors on embedded system inside a grow area. Data is sent to a database where user can view via web browser.</a:t>
+            </a:r>
+          </a:p>
+          <a:p>
+            <a:endParaRPr lang="en-US" sz="5400" dirty="0">
+              <a:solidFill>
+                <a:srgbClr val="B9B9B9"/>
+              </a:solidFill>
+            </a:endParaRPr>
+          </a:p>
+          <a:p>
+            <a:r>
+              <a:rPr lang="en-US" sz="5400" dirty="0">
+                <a:solidFill>
+                  <a:srgbClr val="B9B9B9"/>
+                </a:solidFill>
+              </a:rPr>
+              <a:t>Grow area has an automated ventilation, irrigation and artificial light system. This ensures optimum growth and allows adjusting of the environment. </a:t>
+            </a:r>
+          </a:p>
+          <a:p>
+            <a:endParaRPr lang="en-US" sz="5400" dirty="0">
+              <a:solidFill>
+                <a:srgbClr val="B9B9B9"/>
+              </a:solidFill>
+            </a:endParaRPr>
+          </a:p>
+          <a:p>
+            <a:endParaRPr lang="en-US" sz="5400" dirty="0">
+              <a:solidFill>
+                <a:srgbClr val="B9B9B9"/>
+              </a:solidFill>
+            </a:endParaRPr>
+          </a:p>
+          <a:p>
+            <a:r>
+              <a:rPr lang="en-US" sz="6000" dirty="0">
+                <a:solidFill>
+                  <a:srgbClr val="B9B9B9"/>
+                </a:solidFill>
+              </a:rPr>
+              <a:t>Advantages:</a:t>
+            </a:r>
+          </a:p>
+          <a:p>
+            <a:pPr marL="857250" indent="-857250">
+              <a:buFont typeface="Arial" panose="020B0604020202020204" pitchFamily="34" charset="0"/>
+              <a:buChar char="•"/>
+            </a:pPr>
+            <a:r>
+              <a:rPr lang="en-US" sz="6000" dirty="0">
+                <a:solidFill>
+                  <a:srgbClr val="B9B9B9"/>
+                </a:solidFill>
+              </a:rPr>
+              <a:t>Reduces work in grow area.</a:t>
+            </a:r>
+          </a:p>
+          <a:p>
+            <a:pPr marL="857250" indent="-857250">
+              <a:buFont typeface="Arial" panose="020B0604020202020204" pitchFamily="34" charset="0"/>
+              <a:buChar char="•"/>
+            </a:pPr>
+            <a:r>
+              <a:rPr lang="en-US" sz="6000" dirty="0">
+                <a:solidFill>
+                  <a:srgbClr val="B9B9B9"/>
+                </a:solidFill>
+              </a:rPr>
+              <a:t>Monitors water, air and climate enabling user to control environment more effectively.</a:t>
+            </a:r>
+          </a:p>
+          <a:p>
+            <a:pPr marL="857250" indent="-857250">
+              <a:buFont typeface="Arial" panose="020B0604020202020204" pitchFamily="34" charset="0"/>
+              <a:buChar char="•"/>
+            </a:pPr>
+            <a:r>
+              <a:rPr lang="en-US" sz="6000" dirty="0">
+                <a:solidFill>
+                  <a:srgbClr val="B9B9B9"/>
+                </a:solidFill>
+              </a:rPr>
+              <a:t>Low power system.</a:t>
+            </a:r>
+          </a:p>
+          <a:p>
+            <a:endParaRPr lang="en-US" sz="5400" dirty="0"/>
+          </a:p>
+          <a:p>
+            <a:endParaRPr lang="en-US" sz="5400" dirty="0"/>
+          </a:p>
+          <a:p>
+            <a:endParaRPr lang="en-US" sz="5400" dirty="0"/>
+          </a:p>
+          <a:p>
+            <a:endParaRPr lang="en-US" sz="5400" dirty="0"/>
+          </a:p>
+          <a:p>
+            <a:endParaRPr lang="en-US" sz="5400" dirty="0"/>
+          </a:p>
+          <a:p>
+            <a:endParaRPr lang="en-IE" sz="5400" dirty="0"/>
+          </a:p>
+        </p:txBody>
+      </p:sp>
+      <p:sp>
+        <p:nvSpPr>
+          <p:cNvPr id="15" name="TextBox 14">
+            <a:extLst>
+              <a:ext uri="{FF2B5EF4-FFF2-40B4-BE49-F238E27FC236}">
+                <a16:creationId xmlns:a16="http://schemas.microsoft.com/office/drawing/2014/main" id="{2AA33075-9F88-44FE-AAE7-74F49D66E87B}"/>
+              </a:ext>
+            </a:extLst>
+          </p:cNvPr>
+          <p:cNvSpPr txBox="1"/>
+          <p:nvPr/>
+        </p:nvSpPr>
+        <p:spPr>
+          <a:xfrm>
+            <a:off x="0" y="0"/>
+            <a:ext cx="30275213" cy="1569660"/>
+          </a:xfrm>
+          <a:prstGeom prst="rect">
+            <a:avLst/>
+          </a:prstGeom>
+          <a:solidFill>
+            <a:srgbClr val="73A514"/>
+          </a:solidFill>
+        </p:spPr>
+        <p:txBody>
+          <a:bodyPr wrap="square" rtlCol="0">
+            <a:spAutoFit/>
+          </a:bodyPr>
+          <a:lstStyle/>
+          <a:p>
+            <a:pPr algn="ctr"/>
+            <a:r>
+              <a:rPr lang="en-US" sz="9600" dirty="0">
+                <a:solidFill>
+                  <a:schemeClr val="bg1"/>
+                </a:solidFill>
+              </a:rPr>
+              <a:t>Project</a:t>
+            </a:r>
+            <a:r>
+              <a:rPr lang="en-US" sz="9600" dirty="0"/>
+              <a:t> </a:t>
+            </a:r>
+            <a:r>
+              <a:rPr lang="en-US" sz="9600" dirty="0">
+                <a:solidFill>
+                  <a:schemeClr val="bg1"/>
+                </a:solidFill>
+              </a:rPr>
+              <a:t>Grow</a:t>
+            </a:r>
+          </a:p>
+        </p:txBody>
+      </p:sp>
       <p:pic>
         <p:nvPicPr>
-          <p:cNvPr id="13" name="Picture 12">
+          <p:cNvPr id="3" name="Picture 2">
             <a:extLst>
               <a:ext uri="{FF2B5EF4-FFF2-40B4-BE49-F238E27FC236}">
-                <a16:creationId xmlns:a16="http://schemas.microsoft.com/office/drawing/2014/main" id="{FBE6C8C5-3029-4872-A546-5A94B9BBF27E}"/>
+                <a16:creationId xmlns:a16="http://schemas.microsoft.com/office/drawing/2014/main" id="{09710AA4-A996-4D3C-B356-85C969F0198E}"/>
               </a:ext>
             </a:extLst>
           </p:cNvPr>
@@ -2994,185 +3209,14 @@
         </p:blipFill>
         <p:spPr>
           <a:xfrm>
-            <a:off x="0" y="29744894"/>
-            <a:ext cx="17402319" cy="11912461"/>
+            <a:off x="805570" y="31242001"/>
+            <a:ext cx="14332036" cy="9810750"/>
           </a:xfrm>
           <a:prstGeom prst="rect">
             <a:avLst/>
           </a:prstGeom>
         </p:spPr>
       </p:pic>
-      <p:sp>
-        <p:nvSpPr>
-          <p:cNvPr id="14" name="TextBox 13">
-            <a:extLst>
-              <a:ext uri="{FF2B5EF4-FFF2-40B4-BE49-F238E27FC236}">
-                <a16:creationId xmlns:a16="http://schemas.microsoft.com/office/drawing/2014/main" id="{1933FFE1-CA7C-4A73-8779-2FD9CC1BA72C}"/>
-              </a:ext>
-            </a:extLst>
-          </p:cNvPr>
-          <p:cNvSpPr txBox="1"/>
-          <p:nvPr/>
-        </p:nvSpPr>
-        <p:spPr>
-          <a:xfrm>
-            <a:off x="1200151" y="4148418"/>
-            <a:ext cx="15773400" cy="21421249"/>
-          </a:xfrm>
-          <a:prstGeom prst="rect">
-            <a:avLst/>
-          </a:prstGeom>
-          <a:noFill/>
-        </p:spPr>
-        <p:txBody>
-          <a:bodyPr wrap="square" rtlCol="0">
-            <a:spAutoFit/>
-          </a:bodyPr>
-          <a:lstStyle/>
-          <a:p>
-            <a:pPr algn="ctr"/>
-            <a:r>
-              <a:rPr lang="en-US" sz="6000" b="1" dirty="0">
-                <a:latin typeface="Arial" panose="020B0604020202020204" pitchFamily="34" charset="0"/>
-                <a:cs typeface="Arial" panose="020B0604020202020204" pitchFamily="34" charset="0"/>
-              </a:rPr>
-              <a:t>Summary</a:t>
-            </a:r>
-          </a:p>
-          <a:p>
-            <a:endParaRPr lang="en-US" sz="5400" dirty="0"/>
-          </a:p>
-          <a:p>
-            <a:r>
-              <a:rPr lang="en-US" sz="5400" dirty="0"/>
-              <a:t>Aim of project is to monitor and regulate various environment variables, such as temperature, humidity, light, air and water. This is achieved by reading data from sensors on embedded system inside a grow area. Data is sent to a database where user can view via web browser.</a:t>
-            </a:r>
-          </a:p>
-          <a:p>
-            <a:endParaRPr lang="en-US" sz="5400" dirty="0"/>
-          </a:p>
-          <a:p>
-            <a:r>
-              <a:rPr lang="en-US" sz="5400" dirty="0"/>
-              <a:t>Grow area has an automated ventilation, irrigation and artificial light system. This ensures optimum growth and allows adjusting of the environment. </a:t>
-            </a:r>
-          </a:p>
-          <a:p>
-            <a:endParaRPr lang="en-US" sz="5400" dirty="0"/>
-          </a:p>
-          <a:p>
-            <a:endParaRPr lang="en-US" sz="5400" dirty="0"/>
-          </a:p>
-          <a:p>
-            <a:r>
-              <a:rPr lang="en-US" sz="6000" dirty="0"/>
-              <a:t>Advantages:</a:t>
-            </a:r>
-          </a:p>
-          <a:p>
-            <a:pPr marL="857250" indent="-857250">
-              <a:buFont typeface="Arial" panose="020B0604020202020204" pitchFamily="34" charset="0"/>
-              <a:buChar char="•"/>
-            </a:pPr>
-            <a:r>
-              <a:rPr lang="en-US" sz="6000" dirty="0"/>
-              <a:t>Reduces work in grow area.</a:t>
-            </a:r>
-          </a:p>
-          <a:p>
-            <a:pPr marL="857250" indent="-857250">
-              <a:buFont typeface="Arial" panose="020B0604020202020204" pitchFamily="34" charset="0"/>
-              <a:buChar char="•"/>
-            </a:pPr>
-            <a:r>
-              <a:rPr lang="en-US" sz="6000" dirty="0"/>
-              <a:t>Monitors water, air and climate enabling user to control environment more effectively.</a:t>
-            </a:r>
-          </a:p>
-          <a:p>
-            <a:pPr marL="857250" indent="-857250">
-              <a:buFont typeface="Arial" panose="020B0604020202020204" pitchFamily="34" charset="0"/>
-              <a:buChar char="•"/>
-            </a:pPr>
-            <a:r>
-              <a:rPr lang="en-US" sz="6000" dirty="0"/>
-              <a:t>Low power system.</a:t>
-            </a:r>
-          </a:p>
-          <a:p>
-            <a:endParaRPr lang="en-US" sz="5400" dirty="0"/>
-          </a:p>
-          <a:p>
-            <a:endParaRPr lang="en-US" sz="5400" dirty="0"/>
-          </a:p>
-          <a:p>
-            <a:endParaRPr lang="en-US" sz="5400" dirty="0"/>
-          </a:p>
-          <a:p>
-            <a:endParaRPr lang="en-US" sz="5400" dirty="0"/>
-          </a:p>
-          <a:p>
-            <a:endParaRPr lang="en-US" sz="5400" dirty="0"/>
-          </a:p>
-          <a:p>
-            <a:endParaRPr lang="en-IE" sz="5400" dirty="0"/>
-          </a:p>
-        </p:txBody>
-      </p:sp>
-      <p:sp>
-        <p:nvSpPr>
-          <p:cNvPr id="15" name="TextBox 14">
-            <a:extLst>
-              <a:ext uri="{FF2B5EF4-FFF2-40B4-BE49-F238E27FC236}">
-                <a16:creationId xmlns:a16="http://schemas.microsoft.com/office/drawing/2014/main" id="{2AA33075-9F88-44FE-AAE7-74F49D66E87B}"/>
-              </a:ext>
-            </a:extLst>
-          </p:cNvPr>
-          <p:cNvSpPr txBox="1"/>
-          <p:nvPr/>
-        </p:nvSpPr>
-        <p:spPr>
-          <a:xfrm>
-            <a:off x="0" y="0"/>
-            <a:ext cx="30275213" cy="1569660"/>
-          </a:xfrm>
-          <a:prstGeom prst="rect">
-            <a:avLst/>
-          </a:prstGeom>
-          <a:solidFill>
-            <a:srgbClr val="73A514"/>
-          </a:solidFill>
-        </p:spPr>
-        <p:txBody>
-          <a:bodyPr wrap="square" rtlCol="0">
-            <a:spAutoFit/>
-          </a:bodyPr>
-          <a:lstStyle/>
-          <a:p>
-            <a:pPr algn="ctr"/>
-            <a:r>
-              <a:rPr lang="en-US" sz="9600" dirty="0">
-                <a:solidFill>
-                  <a:schemeClr val="bg1"/>
-                </a:solidFill>
-              </a:rPr>
-              <a:t>Project</a:t>
-            </a:r>
-            <a:r>
-              <a:rPr lang="en-US" sz="9600" dirty="0"/>
-              <a:t> </a:t>
-            </a:r>
-            <a:r>
-              <a:rPr lang="en-US" sz="9600" dirty="0">
-                <a:solidFill>
-                  <a:schemeClr val="bg1"/>
-                </a:solidFill>
-              </a:rPr>
-              <a:t>Grow</a:t>
-            </a:r>
-          </a:p>
-        </p:txBody>
-      </p:sp>
     </p:spTree>
     <p:extLst>
       <p:ext uri="{BB962C8B-B14F-4D97-AF65-F5344CB8AC3E}">

</xml_diff>